<commit_message>
added latest poster version
</commit_message>
<xml_diff>
--- a/36x48-poster.pptx
+++ b/36x48-poster.pptx
@@ -485,7 +485,7 @@
               <a:pPr>
                 <a:defRPr/>
               </a:pPr>
-              <a:t>7/27/25</a:t>
+              <a:t>7/29/25</a:t>
             </a:fld>
             <a:endParaRPr lang="en-US"/>
           </a:p>
@@ -4180,7 +4180,7 @@
         </p:nvSpPr>
         <p:spPr bwMode="auto">
           <a:xfrm>
-            <a:off x="10562168" y="2506134"/>
+            <a:off x="10968566" y="1630457"/>
             <a:ext cx="21746632" cy="3115733"/>
           </a:xfrm>
           <a:prstGeom prst="roundRect">
@@ -4256,7 +4256,7 @@
         </p:nvSpPr>
         <p:spPr bwMode="auto">
           <a:xfrm>
-            <a:off x="33189334" y="15036800"/>
+            <a:off x="33161848" y="14548544"/>
             <a:ext cx="9750778" cy="812800"/>
           </a:xfrm>
           <a:prstGeom prst="roundRect">
@@ -4324,7 +4324,7 @@
         </p:nvSpPr>
         <p:spPr bwMode="auto">
           <a:xfrm>
-            <a:off x="33121600" y="8534400"/>
+            <a:off x="33121600" y="7931960"/>
             <a:ext cx="9750778" cy="812800"/>
           </a:xfrm>
           <a:prstGeom prst="roundRect">
@@ -4397,7 +4397,7 @@
         </p:nvSpPr>
         <p:spPr bwMode="auto">
           <a:xfrm>
-            <a:off x="791448" y="22170679"/>
+            <a:off x="831513" y="21338736"/>
             <a:ext cx="9750778" cy="812800"/>
           </a:xfrm>
           <a:prstGeom prst="roundRect">
@@ -4450,7 +4450,7 @@
                 </a:effectLst>
                 <a:latin typeface="Verdana" pitchFamily="34" charset="0"/>
               </a:rPr>
-              <a:t>Methods</a:t>
+              <a:t>Method</a:t>
             </a:r>
           </a:p>
         </p:txBody>
@@ -4465,7 +4465,7 @@
         </p:nvSpPr>
         <p:spPr bwMode="auto">
           <a:xfrm>
-            <a:off x="11578167" y="8534400"/>
+            <a:off x="11428519" y="7934079"/>
             <a:ext cx="20527433" cy="812800"/>
           </a:xfrm>
           <a:prstGeom prst="roundRect">
@@ -4509,7 +4509,7 @@
                 </a:effectLst>
                 <a:latin typeface="Verdana" pitchFamily="34" charset="0"/>
               </a:rPr>
-              <a:t>AI Agent Diagram</a:t>
+              <a:t>	AI Agent Diagram</a:t>
             </a:r>
           </a:p>
         </p:txBody>
@@ -4524,7 +4524,7 @@
         </p:nvSpPr>
         <p:spPr bwMode="auto">
           <a:xfrm>
-            <a:off x="791448" y="13638415"/>
+            <a:off x="839407" y="12916450"/>
             <a:ext cx="9750778" cy="812800"/>
           </a:xfrm>
           <a:prstGeom prst="roundRect">
@@ -4575,123 +4575,6 @@
       </p:sp>
       <p:sp>
         <p:nvSpPr>
-          <p:cNvPr id="1038" name="Text Box 82"/>
-          <p:cNvSpPr txBox="1">
-            <a:spLocks noChangeArrowheads="1"/>
-          </p:cNvSpPr>
-          <p:nvPr/>
-        </p:nvSpPr>
-        <p:spPr bwMode="auto">
-          <a:xfrm>
-            <a:off x="33110311" y="17475200"/>
-            <a:ext cx="9750778" cy="1219200"/>
-          </a:xfrm>
-          <a:prstGeom prst="rect">
-            <a:avLst/>
-          </a:prstGeom>
-          <a:noFill/>
-          <a:ln w="12700">
-            <a:noFill/>
-            <a:miter lim="800000"/>
-            <a:headEnd/>
-            <a:tailEnd/>
-          </a:ln>
-        </p:spPr>
-        <p:txBody>
-          <a:bodyPr lIns="203200"/>
-          <a:lstStyle/>
-          <a:p>
-            <a:pPr marL="254003" indent="-254003" algn="just" eaLnBrk="0" hangingPunct="0">
-              <a:lnSpc>
-                <a:spcPct val="90000"/>
-              </a:lnSpc>
-              <a:buFontTx/>
-              <a:buChar char="1"/>
-            </a:pPr>
-            <a:r>
-              <a:rPr lang="en-US" sz="1600" dirty="0">
-                <a:solidFill>
-                  <a:srgbClr val="000062"/>
-                </a:solidFill>
-                <a:latin typeface="Arial" charset="0"/>
-              </a:rPr>
-              <a:t>Quigley HA, Nickells RW, Kerrigan LA, Pease ME, Thibault DJ, Zack DJ. </a:t>
-            </a:r>
-            <a:r>
-              <a:rPr lang="en-US" sz="1600" b="1" dirty="0">
-                <a:solidFill>
-                  <a:srgbClr val="000062"/>
-                </a:solidFill>
-                <a:latin typeface="Arial" charset="0"/>
-              </a:rPr>
-              <a:t>Retinal ganglion cell death in experimental glaucoma and after axotomy occurs by apoptosis</a:t>
-            </a:r>
-            <a:r>
-              <a:rPr lang="en-US" sz="1600" dirty="0">
-                <a:solidFill>
-                  <a:srgbClr val="000062"/>
-                </a:solidFill>
-                <a:latin typeface="Arial" charset="0"/>
-              </a:rPr>
-              <a:t>. </a:t>
-            </a:r>
-            <a:r>
-              <a:rPr lang="en-US" sz="1600" i="1" dirty="0">
-                <a:solidFill>
-                  <a:srgbClr val="000062"/>
-                </a:solidFill>
-                <a:latin typeface="Arial" charset="0"/>
-              </a:rPr>
-              <a:t>Invest </a:t>
-            </a:r>
-            <a:r>
-              <a:rPr lang="en-US" sz="1600" i="1" dirty="0" err="1">
-                <a:solidFill>
-                  <a:srgbClr val="000062"/>
-                </a:solidFill>
-                <a:latin typeface="Arial" charset="0"/>
-              </a:rPr>
-              <a:t>Ophthalmol</a:t>
-            </a:r>
-            <a:r>
-              <a:rPr lang="en-US" sz="1600" i="1" dirty="0">
-                <a:solidFill>
-                  <a:srgbClr val="000062"/>
-                </a:solidFill>
-                <a:latin typeface="Arial" charset="0"/>
-              </a:rPr>
-              <a:t> Vis Sci</a:t>
-            </a:r>
-            <a:r>
-              <a:rPr lang="en-US" sz="1600" dirty="0">
-                <a:solidFill>
-                  <a:srgbClr val="000062"/>
-                </a:solidFill>
-                <a:latin typeface="Arial" charset="0"/>
-              </a:rPr>
-              <a:t> 1995;36:774-86.</a:t>
-            </a:r>
-          </a:p>
-          <a:p>
-            <a:pPr marL="254003" indent="-254003" algn="just" eaLnBrk="0" hangingPunct="0">
-              <a:lnSpc>
-                <a:spcPct val="90000"/>
-              </a:lnSpc>
-            </a:pPr>
-            <a:r>
-              <a:rPr lang="en-US" sz="1600" dirty="0">
-                <a:solidFill>
-                  <a:srgbClr val="000062"/>
-                </a:solidFill>
-                <a:latin typeface="Arial" charset="0"/>
-              </a:rPr>
-              <a:t>, </a:t>
-            </a:r>
-          </a:p>
-        </p:txBody>
-      </p:sp>
-      <p:sp>
-        <p:nvSpPr>
           <p:cNvPr id="2167" name="AutoShape 119"/>
           <p:cNvSpPr>
             <a:spLocks noChangeArrowheads="1"/>
@@ -4700,7 +4583,7 @@
         </p:nvSpPr>
         <p:spPr bwMode="auto">
           <a:xfrm>
-            <a:off x="811390" y="8534400"/>
+            <a:off x="811389" y="7933262"/>
             <a:ext cx="9750778" cy="812800"/>
           </a:xfrm>
           <a:prstGeom prst="roundRect">
@@ -4866,7 +4749,7 @@
         </p:nvSpPr>
         <p:spPr bwMode="auto">
           <a:xfrm>
-            <a:off x="811388" y="9687801"/>
+            <a:off x="811389" y="9131831"/>
             <a:ext cx="9889067" cy="3539430"/>
           </a:xfrm>
           <a:prstGeom prst="rect">
@@ -4910,7 +4793,7 @@
         </p:nvSpPr>
         <p:spPr bwMode="auto">
           <a:xfrm>
-            <a:off x="791448" y="14821759"/>
+            <a:off x="836369" y="14109821"/>
             <a:ext cx="9889067" cy="6986528"/>
           </a:xfrm>
           <a:prstGeom prst="rect">
@@ -4954,8 +4837,8 @@
         </p:nvSpPr>
         <p:spPr bwMode="auto">
           <a:xfrm>
-            <a:off x="811388" y="23402815"/>
-            <a:ext cx="9889067" cy="1815882"/>
+            <a:off x="861915" y="22534909"/>
+            <a:ext cx="9889067" cy="2246769"/>
           </a:xfrm>
           <a:prstGeom prst="rect">
             <a:avLst/>
@@ -4983,7 +4866,7 @@
               <a:rPr lang="en-US" sz="2800" dirty="0">
                 <a:latin typeface="Arial" charset="0"/>
               </a:rPr>
-              <a:t>The user’s voice is received via Twilio, transcribed to text by Deepgram (STT), processed by the AI agent, converted back to speech by Deepgram (TTS), and played to the user through Twilio.</a:t>
+              <a:t>The user’s voice is received via Twilio, transcribed to text by Deepgram (STT), processed by the AI agent, converted back to speech by Deepgram (TTS), and played to the user through Twilio. The host server acts as the orchestrator, managing the communication between all components.</a:t>
             </a:r>
           </a:p>
         </p:txBody>
@@ -4998,8 +4881,8 @@
         </p:nvSpPr>
         <p:spPr bwMode="auto">
           <a:xfrm>
-            <a:off x="33121600" y="25400000"/>
-            <a:ext cx="9889067" cy="523220"/>
+            <a:off x="33110311" y="21338736"/>
+            <a:ext cx="9889067" cy="1815882"/>
           </a:xfrm>
           <a:prstGeom prst="rect">
             <a:avLst/>
@@ -5028,7 +4911,7 @@
                 <a:latin typeface="Arial" charset="0"/>
                 <a:cs typeface="Arial" charset="0"/>
               </a:rPr>
-              <a:t>Hello</a:t>
+              <a:t>We would like to thank everyone who contributed to the development and support of this project. We are also grateful to our colleagues and mentors for their feedback and encouragement throughout this work.</a:t>
             </a:r>
           </a:p>
         </p:txBody>
@@ -5043,8 +4926,8 @@
         </p:nvSpPr>
         <p:spPr bwMode="auto">
           <a:xfrm>
-            <a:off x="33075096" y="9723968"/>
-            <a:ext cx="9889067" cy="1843069"/>
+            <a:off x="33075096" y="9223455"/>
+            <a:ext cx="9889067" cy="5004447"/>
           </a:xfrm>
           <a:prstGeom prst="rect">
             <a:avLst/>
@@ -5063,16 +4946,48 @@
           </a:bodyPr>
           <a:lstStyle/>
           <a:p>
-            <a:pPr algn="just">
+            <a:pPr marL="457200" indent="-457200" algn="just">
               <a:spcBef>
                 <a:spcPct val="20000"/>
               </a:spcBef>
+              <a:buFont typeface="Arial" panose="020B0604020202020204" pitchFamily="34" charset="0"/>
+              <a:buChar char="•"/>
             </a:pPr>
             <a:r>
               <a:rPr lang="en-US" sz="2800" dirty="0">
                 <a:latin typeface="Arial" charset="0"/>
               </a:rPr>
-              <a:t>This project demonstrates that integrating modern telephony, speech recognition, and conversational AI technologies enables natural, real-time voice interactions between users and AI agents.</a:t>
+              <a:t>This project demonstrates that integrating modern communication tools, speech recognition, and conversational AI technologies enables natural, real-time voice interactions between users and AI agents.</a:t>
+            </a:r>
+          </a:p>
+          <a:p>
+            <a:pPr marL="457200" indent="-457200" algn="just">
+              <a:spcBef>
+                <a:spcPct val="20000"/>
+              </a:spcBef>
+              <a:buFont typeface="Arial" panose="020B0604020202020204" pitchFamily="34" charset="0"/>
+              <a:buChar char="•"/>
+            </a:pPr>
+            <a:r>
+              <a:rPr lang="en-US" sz="2800" dirty="0">
+                <a:latin typeface="Arial" charset="0"/>
+              </a:rPr>
+              <a:t>The system provides an effective platform for customer support, automated data collection, and other voice-enabled applications, reducing manual effort and streamlining workflows.</a:t>
+            </a:r>
+          </a:p>
+          <a:p>
+            <a:pPr marL="457200" indent="-457200" algn="just">
+              <a:spcBef>
+                <a:spcPct val="20000"/>
+              </a:spcBef>
+              <a:buFont typeface="Arial" panose="020B0604020202020204" pitchFamily="34" charset="0"/>
+              <a:buChar char="•"/>
+            </a:pPr>
+            <a:r>
+              <a:rPr lang="en-US" sz="2800" dirty="0">
+                <a:latin typeface="Arial" charset="0"/>
+              </a:rPr>
+              <a:t>Future work could further enhance accuracy, reduce latency, and introduce more advanced dialogue management or personalized experiences.</a:t>
             </a:r>
           </a:p>
         </p:txBody>
@@ -5087,8 +5002,8 @@
         </p:nvSpPr>
         <p:spPr bwMode="auto">
           <a:xfrm>
-            <a:off x="33245778" y="18631605"/>
-            <a:ext cx="9956800" cy="475387"/>
+            <a:off x="33085982" y="15867578"/>
+            <a:ext cx="9739489" cy="3754874"/>
           </a:xfrm>
           <a:prstGeom prst="rect">
             <a:avLst/>
@@ -5102,21 +5017,161 @@
           </a:ln>
         </p:spPr>
         <p:txBody>
-          <a:bodyPr lIns="162560" rIns="162560">
+          <a:bodyPr wrap="square" lIns="162560" rIns="162560">
             <a:spAutoFit/>
           </a:bodyPr>
           <a:lstStyle/>
           <a:p>
-            <a:pPr algn="just">
+            <a:pPr marL="514350" indent="-514350">
               <a:spcBef>
                 <a:spcPct val="50000"/>
               </a:spcBef>
+              <a:buFont typeface="Arial" panose="020B0604020202020204" pitchFamily="34" charset="0"/>
+              <a:buChar char="•"/>
             </a:pPr>
             <a:r>
-              <a:rPr lang="en-US" sz="2489" dirty="0">
+              <a:rPr lang="en-US" sz="2800" dirty="0">
                 <a:latin typeface="Arial" charset="0"/>
               </a:rPr>
-              <a:t>Are required -  Standard Format. Can make smaller if needed</a:t>
+              <a:t>Twilio Documentation, </a:t>
+            </a:r>
+            <a:r>
+              <a:rPr lang="en-US" sz="2800" dirty="0" err="1">
+                <a:latin typeface="Arial" charset="0"/>
+              </a:rPr>
+              <a:t>TwiML</a:t>
+            </a:r>
+            <a:r>
+              <a:rPr lang="en-US" sz="2800" dirty="0">
+                <a:latin typeface="Arial" charset="0"/>
+              </a:rPr>
+              <a:t>, Media Streams, https://</a:t>
+            </a:r>
+            <a:r>
+              <a:rPr lang="en-US" sz="2800" dirty="0" err="1">
+                <a:latin typeface="Arial" charset="0"/>
+              </a:rPr>
+              <a:t>www.twilio.com</a:t>
+            </a:r>
+            <a:r>
+              <a:rPr lang="en-US" sz="2800" dirty="0">
+                <a:latin typeface="Arial" charset="0"/>
+              </a:rPr>
+              <a:t>/docs</a:t>
+            </a:r>
+          </a:p>
+          <a:p>
+            <a:pPr marL="514350" indent="-514350">
+              <a:spcBef>
+                <a:spcPct val="50000"/>
+              </a:spcBef>
+              <a:buFont typeface="Arial" panose="020B0604020202020204" pitchFamily="34" charset="0"/>
+              <a:buChar char="•"/>
+            </a:pPr>
+            <a:r>
+              <a:rPr lang="en-US" sz="2800" dirty="0">
+                <a:latin typeface="Arial" charset="0"/>
+              </a:rPr>
+              <a:t>Deepgram Documentation, Speech-to-Text and Text-to-Speech, https://</a:t>
+            </a:r>
+            <a:r>
+              <a:rPr lang="en-US" sz="2800" dirty="0" err="1">
+                <a:latin typeface="Arial" charset="0"/>
+              </a:rPr>
+              <a:t>developers.deepgram.com</a:t>
+            </a:r>
+            <a:r>
+              <a:rPr lang="en-US" sz="2800" dirty="0">
+                <a:latin typeface="Arial" charset="0"/>
+              </a:rPr>
+              <a:t>/home</a:t>
+            </a:r>
+          </a:p>
+          <a:p>
+            <a:pPr marL="514350" indent="-514350">
+              <a:spcBef>
+                <a:spcPct val="50000"/>
+              </a:spcBef>
+              <a:buFont typeface="Arial" panose="020B0604020202020204" pitchFamily="34" charset="0"/>
+              <a:buChar char="•"/>
+            </a:pPr>
+            <a:r>
+              <a:rPr lang="en-US" sz="2800" dirty="0" err="1">
+                <a:latin typeface="Arial" charset="0"/>
+              </a:rPr>
+              <a:t>Autogen</a:t>
+            </a:r>
+            <a:r>
+              <a:rPr lang="en-US" sz="2800" dirty="0">
+                <a:latin typeface="Arial" charset="0"/>
+              </a:rPr>
+              <a:t> Documentation, https://</a:t>
+            </a:r>
+            <a:r>
+              <a:rPr lang="en-US" sz="2800" dirty="0" err="1">
+                <a:latin typeface="Arial" charset="0"/>
+              </a:rPr>
+              <a:t>microsoft.github.io</a:t>
+            </a:r>
+            <a:r>
+              <a:rPr lang="en-US" sz="2800" dirty="0">
+                <a:latin typeface="Arial" charset="0"/>
+              </a:rPr>
+              <a:t>/</a:t>
+            </a:r>
+            <a:r>
+              <a:rPr lang="en-US" sz="2800" dirty="0" err="1">
+                <a:latin typeface="Arial" charset="0"/>
+              </a:rPr>
+              <a:t>autogen</a:t>
+            </a:r>
+            <a:r>
+              <a:rPr lang="en-US" sz="2800" dirty="0">
+                <a:latin typeface="Arial" charset="0"/>
+              </a:rPr>
+              <a:t>/stable//</a:t>
+            </a:r>
+            <a:r>
+              <a:rPr lang="en-US" sz="2800" dirty="0" err="1">
+                <a:latin typeface="Arial" charset="0"/>
+              </a:rPr>
+              <a:t>index.html</a:t>
+            </a:r>
+            <a:endParaRPr lang="en-US" sz="2800" dirty="0">
+              <a:latin typeface="Arial" charset="0"/>
+            </a:endParaRPr>
+          </a:p>
+          <a:p>
+            <a:pPr marL="514350" indent="-514350">
+              <a:spcBef>
+                <a:spcPct val="50000"/>
+              </a:spcBef>
+              <a:buFont typeface="Arial" panose="020B0604020202020204" pitchFamily="34" charset="0"/>
+              <a:buChar char="•"/>
+            </a:pPr>
+            <a:r>
+              <a:rPr lang="en-US" sz="2800" dirty="0" err="1">
+                <a:latin typeface="Arial" charset="0"/>
+              </a:rPr>
+              <a:t>Jotform</a:t>
+            </a:r>
+            <a:r>
+              <a:rPr lang="en-US" sz="2800" dirty="0">
+                <a:latin typeface="Arial" charset="0"/>
+              </a:rPr>
+              <a:t>, Developer API, https://</a:t>
+            </a:r>
+            <a:r>
+              <a:rPr lang="en-US" sz="2800" dirty="0" err="1">
+                <a:latin typeface="Arial" charset="0"/>
+              </a:rPr>
+              <a:t>api.jotform.com</a:t>
+            </a:r>
+            <a:r>
+              <a:rPr lang="en-US" sz="2800" dirty="0">
+                <a:latin typeface="Arial" charset="0"/>
+              </a:rPr>
+              <a:t>/docs/</a:t>
             </a:r>
           </a:p>
         </p:txBody>
@@ -5131,7 +5186,7 @@
         </p:nvSpPr>
         <p:spPr bwMode="auto">
           <a:xfrm>
-            <a:off x="16594666" y="23024952"/>
+            <a:off x="16516119" y="25414819"/>
             <a:ext cx="4673600" cy="475387"/>
           </a:xfrm>
           <a:prstGeom prst="rect">
@@ -5172,7 +5227,7 @@
         </p:nvSpPr>
         <p:spPr bwMode="auto">
           <a:xfrm>
-            <a:off x="33245778" y="24180800"/>
+            <a:off x="33161848" y="20032503"/>
             <a:ext cx="9750778" cy="812800"/>
           </a:xfrm>
           <a:prstGeom prst="roundRect">
@@ -5238,7 +5293,7 @@
         </p:nvSpPr>
         <p:spPr>
           <a:xfrm>
-            <a:off x="12728905" y="5913494"/>
+            <a:off x="12728906" y="5233242"/>
             <a:ext cx="18433388" cy="861774"/>
           </a:xfrm>
           <a:prstGeom prst="rect">
@@ -5286,7 +5341,7 @@
         </p:nvSpPr>
         <p:spPr>
           <a:xfrm>
-            <a:off x="13013363" y="6789684"/>
+            <a:off x="13013363" y="6035857"/>
             <a:ext cx="17864472" cy="1323439"/>
           </a:xfrm>
           <a:prstGeom prst="rect">
@@ -5367,7 +5422,7 @@
         </p:blipFill>
         <p:spPr>
           <a:xfrm>
-            <a:off x="35003179" y="2047440"/>
+            <a:off x="35374981" y="907128"/>
             <a:ext cx="5450037" cy="5450037"/>
           </a:xfrm>
           <a:prstGeom prst="rect">
@@ -5403,7 +5458,7 @@
         </p:blipFill>
         <p:spPr>
           <a:xfrm>
-            <a:off x="3304573" y="2490851"/>
+            <a:off x="3410311" y="1468289"/>
             <a:ext cx="4563216" cy="4563216"/>
           </a:xfrm>
           <a:prstGeom prst="rect">
@@ -5425,7 +5480,7 @@
         </p:nvSpPr>
         <p:spPr>
           <a:xfrm>
-            <a:off x="11548299" y="20689949"/>
+            <a:off x="11387994" y="22660970"/>
             <a:ext cx="655970" cy="812800"/>
           </a:xfrm>
           <a:prstGeom prst="rect">
@@ -5490,7 +5545,7 @@
         </p:nvSpPr>
         <p:spPr>
           <a:xfrm>
-            <a:off x="17751928" y="20906228"/>
+            <a:off x="17636915" y="23043209"/>
             <a:ext cx="14353671" cy="1578122"/>
           </a:xfrm>
           <a:prstGeom prst="rect">
@@ -5573,7 +5628,7 @@
         </p:nvSpPr>
         <p:spPr>
           <a:xfrm>
-            <a:off x="17751927" y="22942901"/>
+            <a:off x="17636914" y="24828662"/>
             <a:ext cx="14353671" cy="1131640"/>
           </a:xfrm>
           <a:prstGeom prst="rect">
@@ -5656,7 +5711,7 @@
         </p:nvSpPr>
         <p:spPr>
           <a:xfrm>
-            <a:off x="11507066" y="22219655"/>
+            <a:off x="11379285" y="23983205"/>
             <a:ext cx="3433232" cy="1042990"/>
           </a:xfrm>
           <a:prstGeom prst="rect">
@@ -5723,7 +5778,7 @@
         </p:nvSpPr>
         <p:spPr bwMode="auto">
           <a:xfrm>
-            <a:off x="11578166" y="18949259"/>
+            <a:off x="11499618" y="21338736"/>
             <a:ext cx="20527433" cy="812800"/>
           </a:xfrm>
           <a:prstGeom prst="roundRect">
@@ -5800,7 +5855,7 @@
         </p:nvSpPr>
         <p:spPr>
           <a:xfrm>
-            <a:off x="18097261" y="10074529"/>
+            <a:off x="18146171" y="11537240"/>
             <a:ext cx="7152190" cy="8217342"/>
           </a:xfrm>
           <a:prstGeom prst="rect">
@@ -5862,7 +5917,7 @@
         </p:nvSpPr>
         <p:spPr>
           <a:xfrm>
-            <a:off x="18331733" y="10620631"/>
+            <a:off x="18380643" y="12083342"/>
             <a:ext cx="6730524" cy="2466218"/>
           </a:xfrm>
           <a:prstGeom prst="rect">
@@ -6019,7 +6074,7 @@
         </p:nvSpPr>
         <p:spPr>
           <a:xfrm>
-            <a:off x="18339887" y="13207041"/>
+            <a:off x="18388797" y="14669752"/>
             <a:ext cx="6694655" cy="1817784"/>
           </a:xfrm>
           <a:prstGeom prst="rect">
@@ -6100,7 +6155,7 @@
         </p:nvSpPr>
         <p:spPr>
           <a:xfrm>
-            <a:off x="18331733" y="16730290"/>
+            <a:off x="18380643" y="18193001"/>
             <a:ext cx="6730524" cy="1365577"/>
           </a:xfrm>
           <a:prstGeom prst="rect">
@@ -6181,7 +6236,7 @@
         </p:nvSpPr>
         <p:spPr>
           <a:xfrm>
-            <a:off x="18312172" y="15194769"/>
+            <a:off x="18361082" y="16657480"/>
             <a:ext cx="6722370" cy="1365577"/>
           </a:xfrm>
           <a:prstGeom prst="rect">
@@ -6313,8 +6368,8 @@
         </p:nvSpPr>
         <p:spPr>
           <a:xfrm>
-            <a:off x="20266318" y="10074529"/>
-            <a:ext cx="2814075" cy="523220"/>
+            <a:off x="19695631" y="11570390"/>
+            <a:ext cx="4041482" cy="523220"/>
           </a:xfrm>
           <a:prstGeom prst="rect">
             <a:avLst/>
@@ -6333,8 +6388,19 @@
                 <a:latin typeface="Arial" panose="020B0604020202020204" pitchFamily="34" charset="0"/>
                 <a:cs typeface="Arial" panose="020B0604020202020204" pitchFamily="34" charset="0"/>
               </a:rPr>
-              <a:t>FormAgent</a:t>
-            </a:r>
+              <a:t>FormAgent (</a:t>
+            </a:r>
+            <a:r>
+              <a:rPr lang="en-US" sz="2800" b="1" dirty="0">
+                <a:latin typeface="Arial" panose="020B0604020202020204" pitchFamily="34" charset="0"/>
+                <a:cs typeface="Arial" panose="020B0604020202020204" pitchFamily="34" charset="0"/>
+              </a:rPr>
+              <a:t>gpt-4o)</a:t>
+            </a:r>
+            <a:endParaRPr lang="en-MX" sz="2800" b="1" dirty="0">
+              <a:latin typeface="Arial" panose="020B0604020202020204" pitchFamily="34" charset="0"/>
+              <a:cs typeface="Arial" panose="020B0604020202020204" pitchFamily="34" charset="0"/>
+            </a:endParaRPr>
           </a:p>
         </p:txBody>
       </p:sp>
@@ -6352,7 +6418,7 @@
         </p:nvSpPr>
         <p:spPr>
           <a:xfrm>
-            <a:off x="28209836" y="13561376"/>
+            <a:off x="28258746" y="15024087"/>
             <a:ext cx="3070274" cy="1105513"/>
           </a:xfrm>
           <a:prstGeom prst="rect">
@@ -6422,7 +6488,7 @@
                 <a:latin typeface="Arial" panose="020B0604020202020204" pitchFamily="34" charset="0"/>
                 <a:cs typeface="Arial" panose="020B0604020202020204" pitchFamily="34" charset="0"/>
               </a:rPr>
-              <a:t>(Jotform)</a:t>
+              <a:t>(Jotform API)</a:t>
             </a:r>
           </a:p>
         </p:txBody>
@@ -6441,7 +6507,7 @@
         </p:nvSpPr>
         <p:spPr>
           <a:xfrm>
-            <a:off x="12234137" y="13085833"/>
+            <a:off x="12283047" y="14548544"/>
             <a:ext cx="1675835" cy="1938992"/>
           </a:xfrm>
           <a:prstGeom prst="rect">
@@ -6491,7 +6557,7 @@
         </p:nvSpPr>
         <p:spPr>
           <a:xfrm>
-            <a:off x="14315211" y="13109207"/>
+            <a:off x="14364121" y="14571918"/>
             <a:ext cx="1686211" cy="1938992"/>
           </a:xfrm>
           <a:prstGeom prst="rect">
@@ -6541,7 +6607,7 @@
         </p:nvSpPr>
         <p:spPr>
           <a:xfrm>
-            <a:off x="16363067" y="13109207"/>
+            <a:off x="16411977" y="14571918"/>
             <a:ext cx="1485070" cy="1938992"/>
           </a:xfrm>
           <a:prstGeom prst="rect">
@@ -6594,7 +6660,7 @@
         </p:nvCxnSpPr>
         <p:spPr>
           <a:xfrm rot="10800000">
-            <a:off x="13072055" y="15024825"/>
+            <a:off x="13120965" y="16487536"/>
             <a:ext cx="5240116" cy="1104828"/>
           </a:xfrm>
           <a:prstGeom prst="bentConnector2">
@@ -6634,7 +6700,7 @@
         </p:nvCxnSpPr>
         <p:spPr>
           <a:xfrm rot="10800000">
-            <a:off x="15158318" y="15048200"/>
+            <a:off x="15207228" y="16510911"/>
             <a:ext cx="3153855" cy="829359"/>
           </a:xfrm>
           <a:prstGeom prst="bentConnector2">
@@ -6673,7 +6739,7 @@
         </p:nvCxnSpPr>
         <p:spPr>
           <a:xfrm rot="10800000">
-            <a:off x="17105602" y="15048200"/>
+            <a:off x="17154512" y="16510911"/>
             <a:ext cx="1206570" cy="600767"/>
           </a:xfrm>
           <a:prstGeom prst="bentConnector2">
@@ -6712,7 +6778,7 @@
         </p:nvCxnSpPr>
         <p:spPr>
           <a:xfrm rot="5400000" flipH="1" flipV="1">
-            <a:off x="17514202" y="12311237"/>
+            <a:off x="17563112" y="13773948"/>
             <a:ext cx="389371" cy="1206570"/>
           </a:xfrm>
           <a:prstGeom prst="bentConnector2">
@@ -6754,7 +6820,7 @@
         </p:nvCxnSpPr>
         <p:spPr>
           <a:xfrm rot="5400000" flipH="1" flipV="1">
-            <a:off x="16329330" y="11126364"/>
+            <a:off x="16378240" y="12589075"/>
             <a:ext cx="811831" cy="3153857"/>
           </a:xfrm>
           <a:prstGeom prst="bentConnector2">
@@ -6797,7 +6863,7 @@
         </p:nvCxnSpPr>
         <p:spPr>
           <a:xfrm rot="5400000" flipH="1" flipV="1">
-            <a:off x="15085848" y="9839948"/>
+            <a:off x="15134758" y="11302659"/>
             <a:ext cx="1232093" cy="5259678"/>
           </a:xfrm>
           <a:prstGeom prst="bentConnector2">
@@ -6840,7 +6906,7 @@
         </p:nvCxnSpPr>
         <p:spPr>
           <a:xfrm flipV="1">
-            <a:off x="25034542" y="13722372"/>
+            <a:off x="25083452" y="15185083"/>
             <a:ext cx="1508282" cy="393561"/>
           </a:xfrm>
           <a:prstGeom prst="bentConnector2">
@@ -6876,7 +6942,7 @@
         </p:nvSpPr>
         <p:spPr>
           <a:xfrm>
-            <a:off x="25374940" y="11783380"/>
+            <a:off x="25423850" y="13246091"/>
             <a:ext cx="2335768" cy="1938992"/>
           </a:xfrm>
           <a:prstGeom prst="rect">
@@ -6929,7 +6995,7 @@
         </p:nvCxnSpPr>
         <p:spPr>
           <a:xfrm rot="16200000" flipV="1">
-            <a:off x="25617634" y="10858190"/>
+            <a:off x="25666544" y="12320901"/>
             <a:ext cx="389372" cy="1461008"/>
           </a:xfrm>
           <a:prstGeom prst="bentConnector2">
@@ -6972,7 +7038,7 @@
         </p:nvCxnSpPr>
         <p:spPr>
           <a:xfrm flipV="1">
-            <a:off x="25062257" y="16795902"/>
+            <a:off x="25111167" y="18258613"/>
             <a:ext cx="4682716" cy="617177"/>
           </a:xfrm>
           <a:prstGeom prst="bentConnector2">
@@ -7008,7 +7074,7 @@
         </p:nvSpPr>
         <p:spPr>
           <a:xfrm>
-            <a:off x="28209836" y="15226242"/>
+            <a:off x="28258746" y="16688953"/>
             <a:ext cx="3070274" cy="1569660"/>
           </a:xfrm>
           <a:prstGeom prst="rect">
@@ -7079,7 +7145,7 @@
         </p:nvCxnSpPr>
         <p:spPr>
           <a:xfrm flipV="1">
-            <a:off x="29744973" y="14666889"/>
+            <a:off x="29793883" y="16129600"/>
             <a:ext cx="0" cy="559353"/>
           </a:xfrm>
           <a:prstGeom prst="straightConnector1">
@@ -7118,7 +7184,7 @@
         </p:nvSpPr>
         <p:spPr>
           <a:xfrm>
-            <a:off x="11578166" y="23900592"/>
+            <a:off x="11379285" y="25603890"/>
             <a:ext cx="3052234" cy="830055"/>
           </a:xfrm>
           <a:prstGeom prst="rect">
@@ -7183,7 +7249,7 @@
         </p:nvSpPr>
         <p:spPr>
           <a:xfrm>
-            <a:off x="17751926" y="24529970"/>
+            <a:off x="17636913" y="26248095"/>
             <a:ext cx="14353671" cy="1131640"/>
           </a:xfrm>
           <a:prstGeom prst="rect">
@@ -7232,7 +7298,7 @@
                 <a:latin typeface="Arial" panose="020B0604020202020204" pitchFamily="34" charset="0"/>
                 <a:cs typeface="Arial" panose="020B0604020202020204" pitchFamily="34" charset="0"/>
               </a:rPr>
-              <a:t>Got it. Now please describe the problem you are facing </a:t>
+              <a:t>Got it. Now, please describe the problem you are experiencing.</a:t>
             </a:r>
             <a:endParaRPr lang="en-MX" sz="2800" dirty="0">
               <a:ln w="0"/>
@@ -7266,8 +7332,8 @@
         </p:nvSpPr>
         <p:spPr>
           <a:xfrm>
-            <a:off x="2151033" y="26784262"/>
-            <a:ext cx="6840567" cy="3162337"/>
+            <a:off x="2312643" y="26220238"/>
+            <a:ext cx="6840567" cy="3392265"/>
           </a:xfrm>
           <a:prstGeom prst="rect">
             <a:avLst/>
@@ -7339,53 +7405,6 @@
               <a:t>(FastAPI)</a:t>
             </a:r>
           </a:p>
-        </p:txBody>
-      </p:sp>
-      <p:sp>
-        <p:nvSpPr>
-          <p:cNvPr id="71" name="Rectangle 70">
-            <a:extLst>
-              <a:ext uri="{FF2B5EF4-FFF2-40B4-BE49-F238E27FC236}">
-                <a16:creationId xmlns:a16="http://schemas.microsoft.com/office/drawing/2014/main" id="{1BABE2E7-646F-5DF7-38FE-ABE4798D3B46}"/>
-              </a:ext>
-            </a:extLst>
-          </p:cNvPr>
-          <p:cNvSpPr/>
-          <p:nvPr/>
-        </p:nvSpPr>
-        <p:spPr>
-          <a:xfrm>
-            <a:off x="6624945" y="28667741"/>
-            <a:ext cx="2142208" cy="1039473"/>
-          </a:xfrm>
-          <a:prstGeom prst="rect">
-            <a:avLst/>
-          </a:prstGeom>
-          <a:solidFill>
-            <a:schemeClr val="accent5">
-              <a:lumMod val="40000"/>
-              <a:lumOff val="60000"/>
-            </a:schemeClr>
-          </a:solidFill>
-          <a:ln/>
-        </p:spPr>
-        <p:style>
-          <a:lnRef idx="1">
-            <a:schemeClr val="accent6"/>
-          </a:lnRef>
-          <a:fillRef idx="2">
-            <a:schemeClr val="accent6"/>
-          </a:fillRef>
-          <a:effectRef idx="1">
-            <a:schemeClr val="accent6"/>
-          </a:effectRef>
-          <a:fontRef idx="minor">
-            <a:schemeClr val="dk1"/>
-          </a:fontRef>
-        </p:style>
-        <p:txBody>
-          <a:bodyPr rtlCol="0" anchor="ctr"/>
-          <a:lstStyle/>
           <a:p>
             <a:pPr algn="ctr"/>
             <a:r>
@@ -7404,56 +7423,9 @@
                 <a:latin typeface="Arial" panose="020B0604020202020204" pitchFamily="34" charset="0"/>
                 <a:cs typeface="Arial" panose="020B0604020202020204" pitchFamily="34" charset="0"/>
               </a:rPr>
-              <a:t>Deepgram (STT)</a:t>
-            </a:r>
-          </a:p>
-        </p:txBody>
-      </p:sp>
-      <p:sp>
-        <p:nvSpPr>
-          <p:cNvPr id="72" name="Rectangle 71">
-            <a:extLst>
-              <a:ext uri="{FF2B5EF4-FFF2-40B4-BE49-F238E27FC236}">
-                <a16:creationId xmlns:a16="http://schemas.microsoft.com/office/drawing/2014/main" id="{9822C915-D827-7555-7ACA-C6F7AFC85986}"/>
-              </a:ext>
-            </a:extLst>
-          </p:cNvPr>
-          <p:cNvSpPr/>
-          <p:nvPr/>
-        </p:nvSpPr>
-        <p:spPr>
-          <a:xfrm>
-            <a:off x="2353592" y="26979481"/>
-            <a:ext cx="2142208" cy="1039473"/>
-          </a:xfrm>
-          <a:prstGeom prst="rect">
-            <a:avLst/>
-          </a:prstGeom>
-          <a:solidFill>
-            <a:schemeClr val="accent5">
-              <a:lumMod val="40000"/>
-              <a:lumOff val="60000"/>
-            </a:schemeClr>
-          </a:solidFill>
-          <a:ln/>
-        </p:spPr>
-        <p:style>
-          <a:lnRef idx="1">
-            <a:schemeClr val="accent6"/>
-          </a:lnRef>
-          <a:fillRef idx="2">
-            <a:schemeClr val="accent6"/>
-          </a:fillRef>
-          <a:effectRef idx="1">
-            <a:schemeClr val="accent6"/>
-          </a:effectRef>
-          <a:fontRef idx="minor">
-            <a:schemeClr val="dk1"/>
-          </a:fontRef>
-        </p:style>
-        <p:txBody>
-          <a:bodyPr rtlCol="0" anchor="ctr"/>
-          <a:lstStyle/>
+              <a:t>+</a:t>
+            </a:r>
+          </a:p>
           <a:p>
             <a:pPr algn="ctr"/>
             <a:r>
@@ -7472,7 +7444,143 @@
                 <a:latin typeface="Arial" panose="020B0604020202020204" pitchFamily="34" charset="0"/>
                 <a:cs typeface="Arial" panose="020B0604020202020204" pitchFamily="34" charset="0"/>
               </a:rPr>
-              <a:t>Twilio</a:t>
+              <a:t>Ngrok</a:t>
+            </a:r>
+          </a:p>
+        </p:txBody>
+      </p:sp>
+      <p:sp>
+        <p:nvSpPr>
+          <p:cNvPr id="71" name="Rectangle 70">
+            <a:extLst>
+              <a:ext uri="{FF2B5EF4-FFF2-40B4-BE49-F238E27FC236}">
+                <a16:creationId xmlns:a16="http://schemas.microsoft.com/office/drawing/2014/main" id="{1BABE2E7-646F-5DF7-38FE-ABE4798D3B46}"/>
+              </a:ext>
+            </a:extLst>
+          </p:cNvPr>
+          <p:cNvSpPr/>
+          <p:nvPr/>
+        </p:nvSpPr>
+        <p:spPr>
+          <a:xfrm>
+            <a:off x="6786555" y="28249396"/>
+            <a:ext cx="2142208" cy="1039473"/>
+          </a:xfrm>
+          <a:prstGeom prst="rect">
+            <a:avLst/>
+          </a:prstGeom>
+          <a:solidFill>
+            <a:schemeClr val="accent5">
+              <a:lumMod val="40000"/>
+              <a:lumOff val="60000"/>
+            </a:schemeClr>
+          </a:solidFill>
+          <a:ln/>
+        </p:spPr>
+        <p:style>
+          <a:lnRef idx="1">
+            <a:schemeClr val="accent6"/>
+          </a:lnRef>
+          <a:fillRef idx="2">
+            <a:schemeClr val="accent6"/>
+          </a:fillRef>
+          <a:effectRef idx="1">
+            <a:schemeClr val="accent6"/>
+          </a:effectRef>
+          <a:fontRef idx="minor">
+            <a:schemeClr val="dk1"/>
+          </a:fontRef>
+        </p:style>
+        <p:txBody>
+          <a:bodyPr rtlCol="0" anchor="ctr"/>
+          <a:lstStyle/>
+          <a:p>
+            <a:pPr algn="ctr"/>
+            <a:r>
+              <a:rPr lang="en-MX" sz="2800" dirty="0">
+                <a:ln w="0"/>
+                <a:solidFill>
+                  <a:schemeClr val="tx1"/>
+                </a:solidFill>
+                <a:effectLst>
+                  <a:outerShdw blurRad="38100" dist="19050" dir="2700000" algn="tl" rotWithShape="0">
+                    <a:schemeClr val="dk1">
+                      <a:alpha val="40000"/>
+                    </a:schemeClr>
+                  </a:outerShdw>
+                </a:effectLst>
+                <a:latin typeface="Arial" panose="020B0604020202020204" pitchFamily="34" charset="0"/>
+                <a:cs typeface="Arial" panose="020B0604020202020204" pitchFamily="34" charset="0"/>
+              </a:rPr>
+              <a:t>Deepgram API (STT)</a:t>
+            </a:r>
+          </a:p>
+        </p:txBody>
+      </p:sp>
+      <p:sp>
+        <p:nvSpPr>
+          <p:cNvPr id="72" name="Rectangle 71">
+            <a:extLst>
+              <a:ext uri="{FF2B5EF4-FFF2-40B4-BE49-F238E27FC236}">
+                <a16:creationId xmlns:a16="http://schemas.microsoft.com/office/drawing/2014/main" id="{9822C915-D827-7555-7ACA-C6F7AFC85986}"/>
+              </a:ext>
+            </a:extLst>
+          </p:cNvPr>
+          <p:cNvSpPr/>
+          <p:nvPr/>
+        </p:nvSpPr>
+        <p:spPr>
+          <a:xfrm>
+            <a:off x="2515202" y="26561136"/>
+            <a:ext cx="2142208" cy="1039473"/>
+          </a:xfrm>
+          <a:prstGeom prst="rect">
+            <a:avLst/>
+          </a:prstGeom>
+          <a:solidFill>
+            <a:schemeClr val="accent5">
+              <a:lumMod val="40000"/>
+              <a:lumOff val="60000"/>
+            </a:schemeClr>
+          </a:solidFill>
+          <a:ln/>
+        </p:spPr>
+        <p:style>
+          <a:lnRef idx="1">
+            <a:schemeClr val="accent6"/>
+          </a:lnRef>
+          <a:fillRef idx="2">
+            <a:schemeClr val="accent6"/>
+          </a:fillRef>
+          <a:effectRef idx="1">
+            <a:schemeClr val="accent6"/>
+          </a:effectRef>
+          <a:fontRef idx="minor">
+            <a:schemeClr val="dk1"/>
+          </a:fontRef>
+        </p:style>
+        <p:txBody>
+          <a:bodyPr rtlCol="0" anchor="ctr"/>
+          <a:lstStyle/>
+          <a:p>
+            <a:pPr algn="ctr"/>
+            <a:r>
+              <a:rPr lang="en-MX" sz="2800" dirty="0">
+                <a:ln w="0"/>
+                <a:solidFill>
+                  <a:schemeClr val="tx1"/>
+                </a:solidFill>
+                <a:effectLst>
+                  <a:outerShdw blurRad="38100" dist="19050" dir="2700000" algn="tl" rotWithShape="0">
+                    <a:schemeClr val="dk1">
+                      <a:alpha val="40000"/>
+                    </a:schemeClr>
+                  </a:outerShdw>
+                </a:effectLst>
+                <a:latin typeface="Arial" panose="020B0604020202020204" pitchFamily="34" charset="0"/>
+                <a:cs typeface="Arial" panose="020B0604020202020204" pitchFamily="34" charset="0"/>
+              </a:rPr>
+              <a:t>Twilio API</a:t>
             </a:r>
           </a:p>
           <a:p>
@@ -7512,7 +7620,7 @@
         </p:nvSpPr>
         <p:spPr>
           <a:xfrm>
-            <a:off x="4495800" y="25403483"/>
+            <a:off x="4657410" y="24985138"/>
             <a:ext cx="2142208" cy="1039473"/>
           </a:xfrm>
           <a:prstGeom prst="rect">
@@ -7580,7 +7688,7 @@
         </p:nvSpPr>
         <p:spPr>
           <a:xfrm>
-            <a:off x="4482737" y="30243739"/>
+            <a:off x="4644347" y="29825394"/>
             <a:ext cx="2142208" cy="1039473"/>
           </a:xfrm>
           <a:prstGeom prst="rect">
@@ -7629,56 +7737,9 @@
                 <a:latin typeface="Arial" panose="020B0604020202020204" pitchFamily="34" charset="0"/>
                 <a:cs typeface="Arial" panose="020B0604020202020204" pitchFamily="34" charset="0"/>
               </a:rPr>
-              <a:t>AI Agent</a:t>
-            </a:r>
-          </a:p>
-        </p:txBody>
-      </p:sp>
-      <p:sp>
-        <p:nvSpPr>
-          <p:cNvPr id="75" name="Rectangle 74">
-            <a:extLst>
-              <a:ext uri="{FF2B5EF4-FFF2-40B4-BE49-F238E27FC236}">
-                <a16:creationId xmlns:a16="http://schemas.microsoft.com/office/drawing/2014/main" id="{8646AAD4-EAC6-E9DE-DD87-148216F2A36B}"/>
-              </a:ext>
-            </a:extLst>
-          </p:cNvPr>
-          <p:cNvSpPr/>
-          <p:nvPr/>
-        </p:nvSpPr>
-        <p:spPr>
-          <a:xfrm>
-            <a:off x="2353592" y="28667741"/>
-            <a:ext cx="2142208" cy="1039473"/>
-          </a:xfrm>
-          <a:prstGeom prst="rect">
-            <a:avLst/>
-          </a:prstGeom>
-          <a:solidFill>
-            <a:schemeClr val="accent5">
-              <a:lumMod val="40000"/>
-              <a:lumOff val="60000"/>
-            </a:schemeClr>
-          </a:solidFill>
-          <a:ln/>
-        </p:spPr>
-        <p:style>
-          <a:lnRef idx="1">
-            <a:schemeClr val="accent6"/>
-          </a:lnRef>
-          <a:fillRef idx="2">
-            <a:schemeClr val="accent6"/>
-          </a:fillRef>
-          <a:effectRef idx="1">
-            <a:schemeClr val="accent6"/>
-          </a:effectRef>
-          <a:fontRef idx="minor">
-            <a:schemeClr val="dk1"/>
-          </a:fontRef>
-        </p:style>
-        <p:txBody>
-          <a:bodyPr rtlCol="0" anchor="ctr"/>
-          <a:lstStyle/>
+              <a:t>FormAgent</a:t>
+            </a:r>
+          </a:p>
           <a:p>
             <a:pPr algn="ctr"/>
             <a:r>
@@ -7697,9 +7758,56 @@
                 <a:latin typeface="Arial" panose="020B0604020202020204" pitchFamily="34" charset="0"/>
                 <a:cs typeface="Arial" panose="020B0604020202020204" pitchFamily="34" charset="0"/>
               </a:rPr>
-              <a:t>Deepgram</a:t>
-            </a:r>
-          </a:p>
+              <a:t>(AutoGen)</a:t>
+            </a:r>
+          </a:p>
+        </p:txBody>
+      </p:sp>
+      <p:sp>
+        <p:nvSpPr>
+          <p:cNvPr id="75" name="Rectangle 74">
+            <a:extLst>
+              <a:ext uri="{FF2B5EF4-FFF2-40B4-BE49-F238E27FC236}">
+                <a16:creationId xmlns:a16="http://schemas.microsoft.com/office/drawing/2014/main" id="{8646AAD4-EAC6-E9DE-DD87-148216F2A36B}"/>
+              </a:ext>
+            </a:extLst>
+          </p:cNvPr>
+          <p:cNvSpPr/>
+          <p:nvPr/>
+        </p:nvSpPr>
+        <p:spPr>
+          <a:xfrm>
+            <a:off x="2515202" y="28249396"/>
+            <a:ext cx="2142208" cy="1039473"/>
+          </a:xfrm>
+          <a:prstGeom prst="rect">
+            <a:avLst/>
+          </a:prstGeom>
+          <a:solidFill>
+            <a:schemeClr val="accent5">
+              <a:lumMod val="40000"/>
+              <a:lumOff val="60000"/>
+            </a:schemeClr>
+          </a:solidFill>
+          <a:ln/>
+        </p:spPr>
+        <p:style>
+          <a:lnRef idx="1">
+            <a:schemeClr val="accent6"/>
+          </a:lnRef>
+          <a:fillRef idx="2">
+            <a:schemeClr val="accent6"/>
+          </a:fillRef>
+          <a:effectRef idx="1">
+            <a:schemeClr val="accent6"/>
+          </a:effectRef>
+          <a:fontRef idx="minor">
+            <a:schemeClr val="dk1"/>
+          </a:fontRef>
+        </p:style>
+        <p:txBody>
+          <a:bodyPr rtlCol="0" anchor="ctr"/>
+          <a:lstStyle/>
           <a:p>
             <a:pPr algn="ctr"/>
             <a:r>
@@ -7718,56 +7826,9 @@
                 <a:latin typeface="Arial" panose="020B0604020202020204" pitchFamily="34" charset="0"/>
                 <a:cs typeface="Arial" panose="020B0604020202020204" pitchFamily="34" charset="0"/>
               </a:rPr>
-              <a:t>(TTS)</a:t>
-            </a:r>
-          </a:p>
-        </p:txBody>
-      </p:sp>
-      <p:sp>
-        <p:nvSpPr>
-          <p:cNvPr id="76" name="Rectangle 75">
-            <a:extLst>
-              <a:ext uri="{FF2B5EF4-FFF2-40B4-BE49-F238E27FC236}">
-                <a16:creationId xmlns:a16="http://schemas.microsoft.com/office/drawing/2014/main" id="{85F7AF56-23F1-9A0F-D011-71F8A8B911E3}"/>
-              </a:ext>
-            </a:extLst>
-          </p:cNvPr>
-          <p:cNvSpPr/>
-          <p:nvPr/>
-        </p:nvSpPr>
-        <p:spPr>
-          <a:xfrm>
-            <a:off x="6638009" y="26979481"/>
-            <a:ext cx="2142208" cy="1039473"/>
-          </a:xfrm>
-          <a:prstGeom prst="rect">
-            <a:avLst/>
-          </a:prstGeom>
-          <a:solidFill>
-            <a:schemeClr val="accent5">
-              <a:lumMod val="40000"/>
-              <a:lumOff val="60000"/>
-            </a:schemeClr>
-          </a:solidFill>
-          <a:ln/>
-        </p:spPr>
-        <p:style>
-          <a:lnRef idx="1">
-            <a:schemeClr val="accent6"/>
-          </a:lnRef>
-          <a:fillRef idx="2">
-            <a:schemeClr val="accent6"/>
-          </a:fillRef>
-          <a:effectRef idx="1">
-            <a:schemeClr val="accent6"/>
-          </a:effectRef>
-          <a:fontRef idx="minor">
-            <a:schemeClr val="dk1"/>
-          </a:fontRef>
-        </p:style>
-        <p:txBody>
-          <a:bodyPr rtlCol="0" anchor="ctr"/>
-          <a:lstStyle/>
+              <a:t>Deepgram </a:t>
+            </a:r>
+          </a:p>
           <a:p>
             <a:pPr algn="ctr"/>
             <a:r>
@@ -7786,7 +7847,75 @@
                 <a:latin typeface="Arial" panose="020B0604020202020204" pitchFamily="34" charset="0"/>
                 <a:cs typeface="Arial" panose="020B0604020202020204" pitchFamily="34" charset="0"/>
               </a:rPr>
-              <a:t>Twilio</a:t>
+              <a:t>API (TTS)</a:t>
+            </a:r>
+          </a:p>
+        </p:txBody>
+      </p:sp>
+      <p:sp>
+        <p:nvSpPr>
+          <p:cNvPr id="76" name="Rectangle 75">
+            <a:extLst>
+              <a:ext uri="{FF2B5EF4-FFF2-40B4-BE49-F238E27FC236}">
+                <a16:creationId xmlns:a16="http://schemas.microsoft.com/office/drawing/2014/main" id="{85F7AF56-23F1-9A0F-D011-71F8A8B911E3}"/>
+              </a:ext>
+            </a:extLst>
+          </p:cNvPr>
+          <p:cNvSpPr/>
+          <p:nvPr/>
+        </p:nvSpPr>
+        <p:spPr>
+          <a:xfrm>
+            <a:off x="6799619" y="26561136"/>
+            <a:ext cx="2142208" cy="1039473"/>
+          </a:xfrm>
+          <a:prstGeom prst="rect">
+            <a:avLst/>
+          </a:prstGeom>
+          <a:solidFill>
+            <a:schemeClr val="accent5">
+              <a:lumMod val="40000"/>
+              <a:lumOff val="60000"/>
+            </a:schemeClr>
+          </a:solidFill>
+          <a:ln/>
+        </p:spPr>
+        <p:style>
+          <a:lnRef idx="1">
+            <a:schemeClr val="accent6"/>
+          </a:lnRef>
+          <a:fillRef idx="2">
+            <a:schemeClr val="accent6"/>
+          </a:fillRef>
+          <a:effectRef idx="1">
+            <a:schemeClr val="accent6"/>
+          </a:effectRef>
+          <a:fontRef idx="minor">
+            <a:schemeClr val="dk1"/>
+          </a:fontRef>
+        </p:style>
+        <p:txBody>
+          <a:bodyPr rtlCol="0" anchor="ctr"/>
+          <a:lstStyle/>
+          <a:p>
+            <a:pPr algn="ctr"/>
+            <a:r>
+              <a:rPr lang="en-MX" sz="2800" dirty="0">
+                <a:ln w="0"/>
+                <a:solidFill>
+                  <a:schemeClr val="tx1"/>
+                </a:solidFill>
+                <a:effectLst>
+                  <a:outerShdw blurRad="38100" dist="19050" dir="2700000" algn="tl" rotWithShape="0">
+                    <a:schemeClr val="dk1">
+                      <a:alpha val="40000"/>
+                    </a:schemeClr>
+                  </a:outerShdw>
+                </a:effectLst>
+                <a:latin typeface="Arial" panose="020B0604020202020204" pitchFamily="34" charset="0"/>
+                <a:cs typeface="Arial" panose="020B0604020202020204" pitchFamily="34" charset="0"/>
+              </a:rPr>
+              <a:t>Twilio API</a:t>
             </a:r>
           </a:p>
           <a:p>
@@ -7829,7 +7958,7 @@
         </p:nvCxnSpPr>
         <p:spPr>
           <a:xfrm>
-            <a:off x="6638008" y="25923220"/>
+            <a:off x="6799618" y="25504875"/>
             <a:ext cx="1071105" cy="1056261"/>
           </a:xfrm>
           <a:prstGeom prst="bentConnector2">
@@ -7871,7 +8000,7 @@
         </p:nvCxnSpPr>
         <p:spPr>
           <a:xfrm flipH="1">
-            <a:off x="7696049" y="28018954"/>
+            <a:off x="7857659" y="27600609"/>
             <a:ext cx="13064" cy="648787"/>
           </a:xfrm>
           <a:prstGeom prst="straightConnector1">
@@ -7914,7 +8043,7 @@
         </p:nvCxnSpPr>
         <p:spPr>
           <a:xfrm rot="5400000">
-            <a:off x="6632366" y="29699793"/>
+            <a:off x="6793976" y="29281448"/>
             <a:ext cx="1056262" cy="1071104"/>
           </a:xfrm>
           <a:prstGeom prst="bentConnector2">
@@ -7957,7 +8086,7 @@
         </p:nvCxnSpPr>
         <p:spPr>
           <a:xfrm rot="10800000">
-            <a:off x="3424697" y="29707214"/>
+            <a:off x="3586307" y="29288869"/>
             <a:ext cx="1058041" cy="1056262"/>
           </a:xfrm>
           <a:prstGeom prst="bentConnector2">
@@ -8000,7 +8129,7 @@
         </p:nvCxnSpPr>
         <p:spPr>
           <a:xfrm flipV="1">
-            <a:off x="3424696" y="28018954"/>
+            <a:off x="3586306" y="27600609"/>
             <a:ext cx="0" cy="648787"/>
           </a:xfrm>
           <a:prstGeom prst="straightConnector1">
@@ -8043,7 +8172,7 @@
         </p:nvCxnSpPr>
         <p:spPr>
           <a:xfrm rot="5400000" flipH="1" flipV="1">
-            <a:off x="3432118" y="25915799"/>
+            <a:off x="3593728" y="25497454"/>
             <a:ext cx="1056261" cy="1071104"/>
           </a:xfrm>
           <a:prstGeom prst="bentConnector2">
@@ -8082,8 +8211,8 @@
         </p:nvSpPr>
         <p:spPr>
           <a:xfrm>
-            <a:off x="11578166" y="25430480"/>
-            <a:ext cx="3052234" cy="830055"/>
+            <a:off x="11379285" y="27002736"/>
+            <a:ext cx="4031553" cy="937094"/>
           </a:xfrm>
           <a:prstGeom prst="rect">
             <a:avLst/>
@@ -8128,11 +8257,709 @@
                 <a:latin typeface="Arial" panose="020B0604020202020204" pitchFamily="34" charset="0"/>
                 <a:cs typeface="Arial" panose="020B0604020202020204" pitchFamily="34" charset="0"/>
               </a:rPr>
-              <a:t>peter@gmail.com</a:t>
-            </a:r>
-          </a:p>
-        </p:txBody>
-      </p:sp>
+              <a:t>I forgot the password of my service account</a:t>
+            </a:r>
+          </a:p>
+        </p:txBody>
+      </p:sp>
+      <p:sp>
+        <p:nvSpPr>
+          <p:cNvPr id="3" name="Rectangle 2">
+            <a:extLst>
+              <a:ext uri="{FF2B5EF4-FFF2-40B4-BE49-F238E27FC236}">
+                <a16:creationId xmlns:a16="http://schemas.microsoft.com/office/drawing/2014/main" id="{42B2C4BE-BA4F-96B0-F6CB-6D45220D6D0F}"/>
+              </a:ext>
+            </a:extLst>
+          </p:cNvPr>
+          <p:cNvSpPr/>
+          <p:nvPr/>
+        </p:nvSpPr>
+        <p:spPr>
+          <a:xfrm>
+            <a:off x="17636913" y="27685158"/>
+            <a:ext cx="14353671" cy="1131640"/>
+          </a:xfrm>
+          <a:prstGeom prst="rect">
+            <a:avLst/>
+          </a:prstGeom>
+          <a:solidFill>
+            <a:schemeClr val="accent5">
+              <a:lumMod val="40000"/>
+              <a:lumOff val="60000"/>
+            </a:schemeClr>
+          </a:solidFill>
+          <a:ln/>
+        </p:spPr>
+        <p:style>
+          <a:lnRef idx="1">
+            <a:schemeClr val="accent6"/>
+          </a:lnRef>
+          <a:fillRef idx="2">
+            <a:schemeClr val="accent6"/>
+          </a:fillRef>
+          <a:effectRef idx="1">
+            <a:schemeClr val="accent6"/>
+          </a:effectRef>
+          <a:fontRef idx="minor">
+            <a:schemeClr val="dk1"/>
+          </a:fontRef>
+        </p:style>
+        <p:txBody>
+          <a:bodyPr rtlCol="0" anchor="ctr"/>
+          <a:lstStyle/>
+          <a:p>
+            <a:pPr algn="just"/>
+            <a:r>
+              <a:rPr lang="en-US" sz="2800" dirty="0">
+                <a:ln w="0"/>
+                <a:solidFill>
+                  <a:schemeClr val="tx1"/>
+                </a:solidFill>
+                <a:effectLst>
+                  <a:outerShdw blurRad="38100" dist="19050" dir="2700000" algn="tl" rotWithShape="0">
+                    <a:schemeClr val="dk1">
+                      <a:alpha val="40000"/>
+                    </a:schemeClr>
+                  </a:outerShdw>
+                </a:effectLst>
+                <a:latin typeface="Arial" panose="020B0604020202020204" pitchFamily="34" charset="0"/>
+                <a:cs typeface="Arial" panose="020B0604020202020204" pitchFamily="34" charset="0"/>
+              </a:rPr>
+              <a:t>Got it. Now, please provide a subject for your problem. This will help us categorize and prioritize your request.</a:t>
+            </a:r>
+            <a:endParaRPr lang="en-MX" sz="2800" dirty="0">
+              <a:ln w="0"/>
+              <a:solidFill>
+                <a:schemeClr val="tx1"/>
+              </a:solidFill>
+              <a:effectLst>
+                <a:outerShdw blurRad="38100" dist="19050" dir="2700000" algn="tl" rotWithShape="0">
+                  <a:schemeClr val="dk1">
+                    <a:alpha val="40000"/>
+                  </a:schemeClr>
+                </a:outerShdw>
+              </a:effectLst>
+              <a:latin typeface="Arial" panose="020B0604020202020204" pitchFamily="34" charset="0"/>
+              <a:cs typeface="Arial" panose="020B0604020202020204" pitchFamily="34" charset="0"/>
+            </a:endParaRPr>
+          </a:p>
+        </p:txBody>
+      </p:sp>
+      <p:sp>
+        <p:nvSpPr>
+          <p:cNvPr id="4" name="Rectangle 3">
+            <a:extLst>
+              <a:ext uri="{FF2B5EF4-FFF2-40B4-BE49-F238E27FC236}">
+                <a16:creationId xmlns:a16="http://schemas.microsoft.com/office/drawing/2014/main" id="{5E0BD050-6EC6-5FD2-5240-B47DBC210930}"/>
+              </a:ext>
+            </a:extLst>
+          </p:cNvPr>
+          <p:cNvSpPr/>
+          <p:nvPr/>
+        </p:nvSpPr>
+        <p:spPr>
+          <a:xfrm>
+            <a:off x="11379285" y="28517525"/>
+            <a:ext cx="3052234" cy="830055"/>
+          </a:xfrm>
+          <a:prstGeom prst="rect">
+            <a:avLst/>
+          </a:prstGeom>
+          <a:solidFill>
+            <a:srgbClr val="FCBFBB"/>
+          </a:solidFill>
+          <a:ln/>
+        </p:spPr>
+        <p:style>
+          <a:lnRef idx="1">
+            <a:schemeClr val="accent6"/>
+          </a:lnRef>
+          <a:fillRef idx="2">
+            <a:schemeClr val="accent6"/>
+          </a:fillRef>
+          <a:effectRef idx="1">
+            <a:schemeClr val="accent6"/>
+          </a:effectRef>
+          <a:fontRef idx="minor">
+            <a:schemeClr val="dk1"/>
+          </a:fontRef>
+        </p:style>
+        <p:txBody>
+          <a:bodyPr rtlCol="0" anchor="ctr"/>
+          <a:lstStyle/>
+          <a:p>
+            <a:pPr algn="just"/>
+            <a:r>
+              <a:rPr lang="en-MX" sz="2800" dirty="0">
+                <a:ln w="0"/>
+                <a:solidFill>
+                  <a:schemeClr val="tx1"/>
+                </a:solidFill>
+                <a:effectLst>
+                  <a:outerShdw blurRad="38100" dist="19050" dir="2700000" algn="tl" rotWithShape="0">
+                    <a:schemeClr val="dk1">
+                      <a:alpha val="40000"/>
+                    </a:schemeClr>
+                  </a:outerShdw>
+                </a:effectLst>
+                <a:latin typeface="Arial" panose="020B0604020202020204" pitchFamily="34" charset="0"/>
+                <a:cs typeface="Arial" panose="020B0604020202020204" pitchFamily="34" charset="0"/>
+              </a:rPr>
+              <a:t>Need to restart my password</a:t>
+            </a:r>
+          </a:p>
+        </p:txBody>
+      </p:sp>
+      <p:sp>
+        <p:nvSpPr>
+          <p:cNvPr id="5" name="Rectangle 4">
+            <a:extLst>
+              <a:ext uri="{FF2B5EF4-FFF2-40B4-BE49-F238E27FC236}">
+                <a16:creationId xmlns:a16="http://schemas.microsoft.com/office/drawing/2014/main" id="{51313EF2-8D51-9F8C-1C39-3762FC655496}"/>
+              </a:ext>
+            </a:extLst>
+          </p:cNvPr>
+          <p:cNvSpPr/>
+          <p:nvPr/>
+        </p:nvSpPr>
+        <p:spPr>
+          <a:xfrm>
+            <a:off x="17636913" y="29135631"/>
+            <a:ext cx="14353671" cy="1126681"/>
+          </a:xfrm>
+          <a:prstGeom prst="rect">
+            <a:avLst/>
+          </a:prstGeom>
+          <a:solidFill>
+            <a:schemeClr val="accent5">
+              <a:lumMod val="40000"/>
+              <a:lumOff val="60000"/>
+            </a:schemeClr>
+          </a:solidFill>
+          <a:ln/>
+        </p:spPr>
+        <p:style>
+          <a:lnRef idx="1">
+            <a:schemeClr val="accent6"/>
+          </a:lnRef>
+          <a:fillRef idx="2">
+            <a:schemeClr val="accent6"/>
+          </a:fillRef>
+          <a:effectRef idx="1">
+            <a:schemeClr val="accent6"/>
+          </a:effectRef>
+          <a:fontRef idx="minor">
+            <a:schemeClr val="dk1"/>
+          </a:fontRef>
+        </p:style>
+        <p:txBody>
+          <a:bodyPr rtlCol="0" anchor="ctr"/>
+          <a:lstStyle/>
+          <a:p>
+            <a:pPr algn="just"/>
+            <a:r>
+              <a:rPr lang="en-US" sz="2800" dirty="0">
+                <a:ln w="0"/>
+                <a:solidFill>
+                  <a:schemeClr val="tx1"/>
+                </a:solidFill>
+                <a:effectLst>
+                  <a:outerShdw blurRad="38100" dist="19050" dir="2700000" algn="tl" rotWithShape="0">
+                    <a:schemeClr val="dk1">
+                      <a:alpha val="40000"/>
+                    </a:schemeClr>
+                  </a:outerShdw>
+                </a:effectLst>
+                <a:latin typeface="Arial" panose="020B0604020202020204" pitchFamily="34" charset="0"/>
+                <a:cs typeface="Arial" panose="020B0604020202020204" pitchFamily="34" charset="0"/>
+              </a:rPr>
+              <a:t>Your request has been submitted successfully. The IT team will look into your server access permission issue shortly.</a:t>
+            </a:r>
+            <a:endParaRPr lang="en-MX" sz="2800" dirty="0">
+              <a:ln w="0"/>
+              <a:solidFill>
+                <a:schemeClr val="tx1"/>
+              </a:solidFill>
+              <a:effectLst>
+                <a:outerShdw blurRad="38100" dist="19050" dir="2700000" algn="tl" rotWithShape="0">
+                  <a:schemeClr val="dk1">
+                    <a:alpha val="40000"/>
+                  </a:schemeClr>
+                </a:outerShdw>
+              </a:effectLst>
+              <a:latin typeface="Arial" panose="020B0604020202020204" pitchFamily="34" charset="0"/>
+              <a:cs typeface="Arial" panose="020B0604020202020204" pitchFamily="34" charset="0"/>
+            </a:endParaRPr>
+          </a:p>
+        </p:txBody>
+      </p:sp>
+      <p:sp>
+        <p:nvSpPr>
+          <p:cNvPr id="9" name="Rectangle 8">
+            <a:extLst>
+              <a:ext uri="{FF2B5EF4-FFF2-40B4-BE49-F238E27FC236}">
+                <a16:creationId xmlns:a16="http://schemas.microsoft.com/office/drawing/2014/main" id="{3DF8D2D9-0644-8E0D-0952-94366B2EB3CC}"/>
+              </a:ext>
+            </a:extLst>
+          </p:cNvPr>
+          <p:cNvSpPr/>
+          <p:nvPr/>
+        </p:nvSpPr>
+        <p:spPr>
+          <a:xfrm>
+            <a:off x="11379285" y="29916371"/>
+            <a:ext cx="3052234" cy="830055"/>
+          </a:xfrm>
+          <a:prstGeom prst="rect">
+            <a:avLst/>
+          </a:prstGeom>
+          <a:solidFill>
+            <a:srgbClr val="FCBFBB"/>
+          </a:solidFill>
+          <a:ln/>
+        </p:spPr>
+        <p:style>
+          <a:lnRef idx="1">
+            <a:schemeClr val="accent6"/>
+          </a:lnRef>
+          <a:fillRef idx="2">
+            <a:schemeClr val="accent6"/>
+          </a:fillRef>
+          <a:effectRef idx="1">
+            <a:schemeClr val="accent6"/>
+          </a:effectRef>
+          <a:fontRef idx="minor">
+            <a:schemeClr val="dk1"/>
+          </a:fontRef>
+        </p:style>
+        <p:txBody>
+          <a:bodyPr rtlCol="0" anchor="ctr"/>
+          <a:lstStyle/>
+          <a:p>
+            <a:pPr algn="just"/>
+            <a:r>
+              <a:rPr lang="en-MX" sz="2800" dirty="0">
+                <a:ln w="0"/>
+                <a:solidFill>
+                  <a:schemeClr val="tx1"/>
+                </a:solidFill>
+                <a:effectLst>
+                  <a:outerShdw blurRad="38100" dist="19050" dir="2700000" algn="tl" rotWithShape="0">
+                    <a:schemeClr val="dk1">
+                      <a:alpha val="40000"/>
+                    </a:schemeClr>
+                  </a:outerShdw>
+                </a:effectLst>
+                <a:latin typeface="Arial" panose="020B0604020202020204" pitchFamily="34" charset="0"/>
+                <a:cs typeface="Arial" panose="020B0604020202020204" pitchFamily="34" charset="0"/>
+              </a:rPr>
+              <a:t>Thanks, goodbye.</a:t>
+            </a:r>
+          </a:p>
+        </p:txBody>
+      </p:sp>
+      <p:sp>
+        <p:nvSpPr>
+          <p:cNvPr id="13" name="TextBox 12">
+            <a:extLst>
+              <a:ext uri="{FF2B5EF4-FFF2-40B4-BE49-F238E27FC236}">
+                <a16:creationId xmlns:a16="http://schemas.microsoft.com/office/drawing/2014/main" id="{ED76C882-A27E-C53F-4B82-47E05BE7FB94}"/>
+              </a:ext>
+            </a:extLst>
+          </p:cNvPr>
+          <p:cNvSpPr txBox="1"/>
+          <p:nvPr/>
+        </p:nvSpPr>
+        <p:spPr>
+          <a:xfrm>
+            <a:off x="43746821" y="15953874"/>
+            <a:ext cx="184731" cy="461665"/>
+          </a:xfrm>
+          <a:prstGeom prst="rect">
+            <a:avLst/>
+          </a:prstGeom>
+          <a:noFill/>
+        </p:spPr>
+        <p:txBody>
+          <a:bodyPr wrap="none" rtlCol="0">
+            <a:spAutoFit/>
+          </a:bodyPr>
+          <a:lstStyle/>
+          <a:p>
+            <a:endParaRPr lang="en-MX" dirty="0"/>
+          </a:p>
+        </p:txBody>
+      </p:sp>
+      <p:sp>
+        <p:nvSpPr>
+          <p:cNvPr id="12" name="Text Box 215">
+            <a:extLst>
+              <a:ext uri="{FF2B5EF4-FFF2-40B4-BE49-F238E27FC236}">
+                <a16:creationId xmlns:a16="http://schemas.microsoft.com/office/drawing/2014/main" id="{D3BCBD86-24CC-FF6F-FDEF-F908F3D21064}"/>
+              </a:ext>
+            </a:extLst>
+          </p:cNvPr>
+          <p:cNvSpPr txBox="1">
+            <a:spLocks noChangeArrowheads="1"/>
+          </p:cNvSpPr>
+          <p:nvPr/>
+        </p:nvSpPr>
+        <p:spPr bwMode="auto">
+          <a:xfrm>
+            <a:off x="839407" y="31188501"/>
+            <a:ext cx="9722760" cy="523220"/>
+          </a:xfrm>
+          <a:prstGeom prst="rect">
+            <a:avLst/>
+          </a:prstGeom>
+          <a:noFill/>
+          <a:ln w="63500">
+            <a:noFill/>
+            <a:miter lim="800000"/>
+            <a:headEnd/>
+            <a:tailEnd/>
+          </a:ln>
+        </p:spPr>
+        <p:txBody>
+          <a:bodyPr wrap="square" lIns="162560" rIns="162560">
+            <a:spAutoFit/>
+          </a:bodyPr>
+          <a:lstStyle/>
+          <a:p>
+            <a:pPr>
+              <a:spcBef>
+                <a:spcPct val="50000"/>
+              </a:spcBef>
+            </a:pPr>
+            <a:r>
+              <a:rPr lang="en-US" sz="2800" dirty="0">
+                <a:latin typeface="Arial" charset="0"/>
+              </a:rPr>
+              <a:t>Figure 1: High-level diagram of the AI voice agent system.</a:t>
+            </a:r>
+          </a:p>
+        </p:txBody>
+      </p:sp>
+      <p:sp>
+        <p:nvSpPr>
+          <p:cNvPr id="14" name="Text Box 215">
+            <a:extLst>
+              <a:ext uri="{FF2B5EF4-FFF2-40B4-BE49-F238E27FC236}">
+                <a16:creationId xmlns:a16="http://schemas.microsoft.com/office/drawing/2014/main" id="{8E317085-1A97-0887-8397-0BD78DE99D95}"/>
+              </a:ext>
+            </a:extLst>
+          </p:cNvPr>
+          <p:cNvSpPr txBox="1">
+            <a:spLocks noChangeArrowheads="1"/>
+          </p:cNvSpPr>
+          <p:nvPr/>
+        </p:nvSpPr>
+        <p:spPr bwMode="auto">
+          <a:xfrm>
+            <a:off x="18889749" y="20029333"/>
+            <a:ext cx="5653245" cy="539654"/>
+          </a:xfrm>
+          <a:prstGeom prst="rect">
+            <a:avLst/>
+          </a:prstGeom>
+          <a:noFill/>
+          <a:ln w="63500">
+            <a:noFill/>
+            <a:miter lim="800000"/>
+            <a:headEnd/>
+            <a:tailEnd/>
+          </a:ln>
+        </p:spPr>
+        <p:txBody>
+          <a:bodyPr wrap="square" lIns="162560" rIns="162560">
+            <a:spAutoFit/>
+          </a:bodyPr>
+          <a:lstStyle/>
+          <a:p>
+            <a:pPr>
+              <a:spcBef>
+                <a:spcPct val="50000"/>
+              </a:spcBef>
+            </a:pPr>
+            <a:r>
+              <a:rPr lang="en-US" sz="2800" dirty="0">
+                <a:latin typeface="Arial" charset="0"/>
+              </a:rPr>
+              <a:t>Figure 2: FormAgent Overview.</a:t>
+            </a:r>
+          </a:p>
+        </p:txBody>
+      </p:sp>
+      <p:sp>
+        <p:nvSpPr>
+          <p:cNvPr id="19" name="TextBox 18">
+            <a:extLst>
+              <a:ext uri="{FF2B5EF4-FFF2-40B4-BE49-F238E27FC236}">
+                <a16:creationId xmlns:a16="http://schemas.microsoft.com/office/drawing/2014/main" id="{4F9D7994-3C98-266B-EFFF-F05A16326F6C}"/>
+              </a:ext>
+            </a:extLst>
+          </p:cNvPr>
+          <p:cNvSpPr txBox="1"/>
+          <p:nvPr/>
+        </p:nvSpPr>
+        <p:spPr>
+          <a:xfrm>
+            <a:off x="25298361" y="9658555"/>
+            <a:ext cx="2335768" cy="954107"/>
+          </a:xfrm>
+          <a:prstGeom prst="rect">
+            <a:avLst/>
+          </a:prstGeom>
+          <a:noFill/>
+        </p:spPr>
+        <p:txBody>
+          <a:bodyPr wrap="square">
+            <a:spAutoFit/>
+          </a:bodyPr>
+          <a:lstStyle/>
+          <a:p>
+            <a:pPr algn="ctr"/>
+            <a:r>
+              <a:rPr lang="en-MX" sz="2800" dirty="0">
+                <a:ln w="0"/>
+                <a:solidFill>
+                  <a:schemeClr val="tx1"/>
+                </a:solidFill>
+                <a:effectLst>
+                  <a:outerShdw blurRad="38100" dist="19050" dir="2700000" algn="tl" rotWithShape="0">
+                    <a:schemeClr val="dk1">
+                      <a:alpha val="40000"/>
+                    </a:schemeClr>
+                  </a:outerShdw>
+                </a:effectLst>
+                <a:latin typeface="Arial" panose="020B0604020202020204" pitchFamily="34" charset="0"/>
+                <a:cs typeface="Arial" panose="020B0604020202020204" pitchFamily="34" charset="0"/>
+              </a:rPr>
+              <a:t>Deepgram (STT)</a:t>
+            </a:r>
+          </a:p>
+        </p:txBody>
+      </p:sp>
+      <p:sp>
+        <p:nvSpPr>
+          <p:cNvPr id="20" name="TextBox 19">
+            <a:extLst>
+              <a:ext uri="{FF2B5EF4-FFF2-40B4-BE49-F238E27FC236}">
+                <a16:creationId xmlns:a16="http://schemas.microsoft.com/office/drawing/2014/main" id="{CF314D37-8554-3A6F-50CC-87FAC070B25E}"/>
+              </a:ext>
+            </a:extLst>
+          </p:cNvPr>
+          <p:cNvSpPr txBox="1"/>
+          <p:nvPr/>
+        </p:nvSpPr>
+        <p:spPr>
+          <a:xfrm>
+            <a:off x="15810403" y="9658554"/>
+            <a:ext cx="2335768" cy="954107"/>
+          </a:xfrm>
+          <a:prstGeom prst="rect">
+            <a:avLst/>
+          </a:prstGeom>
+          <a:noFill/>
+        </p:spPr>
+        <p:txBody>
+          <a:bodyPr wrap="square">
+            <a:spAutoFit/>
+          </a:bodyPr>
+          <a:lstStyle/>
+          <a:p>
+            <a:pPr algn="ctr"/>
+            <a:r>
+              <a:rPr lang="en-MX" sz="2800" dirty="0">
+                <a:ln w="0"/>
+                <a:solidFill>
+                  <a:schemeClr val="tx1"/>
+                </a:solidFill>
+                <a:effectLst>
+                  <a:outerShdw blurRad="38100" dist="19050" dir="2700000" algn="tl" rotWithShape="0">
+                    <a:schemeClr val="dk1">
+                      <a:alpha val="40000"/>
+                    </a:schemeClr>
+                  </a:outerShdw>
+                </a:effectLst>
+                <a:latin typeface="Arial" panose="020B0604020202020204" pitchFamily="34" charset="0"/>
+                <a:cs typeface="Arial" panose="020B0604020202020204" pitchFamily="34" charset="0"/>
+              </a:rPr>
+              <a:t>Deepgram (TTS)</a:t>
+            </a:r>
+          </a:p>
+        </p:txBody>
+      </p:sp>
+      <p:cxnSp>
+        <p:nvCxnSpPr>
+          <p:cNvPr id="21" name="Elbow Connector 20">
+            <a:extLst>
+              <a:ext uri="{FF2B5EF4-FFF2-40B4-BE49-F238E27FC236}">
+                <a16:creationId xmlns:a16="http://schemas.microsoft.com/office/drawing/2014/main" id="{E6723D81-6AE1-C943-9714-5B06501CA49B}"/>
+              </a:ext>
+            </a:extLst>
+          </p:cNvPr>
+          <p:cNvCxnSpPr>
+            <a:cxnSpLocks/>
+            <a:endCxn id="20" idx="3"/>
+          </p:cNvCxnSpPr>
+          <p:nvPr/>
+        </p:nvCxnSpPr>
+        <p:spPr>
+          <a:xfrm rot="16200000" flipV="1">
+            <a:off x="18089059" y="10192721"/>
+            <a:ext cx="1663685" cy="1549460"/>
+          </a:xfrm>
+          <a:prstGeom prst="bentConnector2">
+            <a:avLst/>
+          </a:prstGeom>
+          <a:ln>
+            <a:tailEnd type="triangle"/>
+          </a:ln>
+        </p:spPr>
+        <p:style>
+          <a:lnRef idx="3">
+            <a:schemeClr val="dk1"/>
+          </a:lnRef>
+          <a:fillRef idx="0">
+            <a:schemeClr val="dk1"/>
+          </a:fillRef>
+          <a:effectRef idx="2">
+            <a:schemeClr val="dk1"/>
+          </a:effectRef>
+          <a:fontRef idx="minor">
+            <a:schemeClr val="tx1"/>
+          </a:fontRef>
+        </p:style>
+      </p:cxnSp>
+      <p:cxnSp>
+        <p:nvCxnSpPr>
+          <p:cNvPr id="25" name="Elbow Connector 24">
+            <a:extLst>
+              <a:ext uri="{FF2B5EF4-FFF2-40B4-BE49-F238E27FC236}">
+                <a16:creationId xmlns:a16="http://schemas.microsoft.com/office/drawing/2014/main" id="{8D905427-FC79-437F-1BEE-0DEE88F94A00}"/>
+              </a:ext>
+            </a:extLst>
+          </p:cNvPr>
+          <p:cNvCxnSpPr>
+            <a:cxnSpLocks/>
+            <a:stCxn id="19" idx="1"/>
+          </p:cNvCxnSpPr>
+          <p:nvPr/>
+        </p:nvCxnSpPr>
+        <p:spPr>
+          <a:xfrm rot="10800000" flipV="1">
+            <a:off x="23737113" y="10135609"/>
+            <a:ext cx="1561248" cy="1721130"/>
+          </a:xfrm>
+          <a:prstGeom prst="bentConnector2">
+            <a:avLst/>
+          </a:prstGeom>
+          <a:ln>
+            <a:tailEnd type="triangle"/>
+          </a:ln>
+        </p:spPr>
+        <p:style>
+          <a:lnRef idx="3">
+            <a:schemeClr val="dk1"/>
+          </a:lnRef>
+          <a:fillRef idx="0">
+            <a:schemeClr val="dk1"/>
+          </a:fillRef>
+          <a:effectRef idx="2">
+            <a:schemeClr val="dk1"/>
+          </a:effectRef>
+          <a:fontRef idx="minor">
+            <a:schemeClr val="tx1"/>
+          </a:fontRef>
+        </p:style>
+      </p:cxnSp>
+      <p:sp>
+        <p:nvSpPr>
+          <p:cNvPr id="53" name="Text Box 215">
+            <a:extLst>
+              <a:ext uri="{FF2B5EF4-FFF2-40B4-BE49-F238E27FC236}">
+                <a16:creationId xmlns:a16="http://schemas.microsoft.com/office/drawing/2014/main" id="{8314BC59-CC46-AE80-1B3E-64CE753590C6}"/>
+              </a:ext>
+            </a:extLst>
+          </p:cNvPr>
+          <p:cNvSpPr txBox="1">
+            <a:spLocks noChangeArrowheads="1"/>
+          </p:cNvSpPr>
+          <p:nvPr/>
+        </p:nvSpPr>
+        <p:spPr bwMode="auto">
+          <a:xfrm>
+            <a:off x="15867115" y="31188501"/>
+            <a:ext cx="12156967" cy="523220"/>
+          </a:xfrm>
+          <a:prstGeom prst="rect">
+            <a:avLst/>
+          </a:prstGeom>
+          <a:noFill/>
+          <a:ln w="63500">
+            <a:noFill/>
+            <a:miter lim="800000"/>
+            <a:headEnd/>
+            <a:tailEnd/>
+          </a:ln>
+        </p:spPr>
+        <p:txBody>
+          <a:bodyPr wrap="square" lIns="162560" rIns="162560">
+            <a:spAutoFit/>
+          </a:bodyPr>
+          <a:lstStyle/>
+          <a:p>
+            <a:pPr>
+              <a:spcBef>
+                <a:spcPct val="50000"/>
+              </a:spcBef>
+            </a:pPr>
+            <a:r>
+              <a:rPr lang="en-US" sz="2800" dirty="0">
+                <a:latin typeface="Arial" charset="0"/>
+              </a:rPr>
+              <a:t>Figure 3: Conversation sequence between a human and the FormAgent.</a:t>
+            </a:r>
+          </a:p>
+        </p:txBody>
+      </p:sp>
+      <p:pic>
+        <p:nvPicPr>
+          <p:cNvPr id="2247" name="Picture 2246" descr="A qr code on a white background&#10;&#10;AI-generated content may be incorrect.">
+            <a:extLst>
+              <a:ext uri="{FF2B5EF4-FFF2-40B4-BE49-F238E27FC236}">
+                <a16:creationId xmlns:a16="http://schemas.microsoft.com/office/drawing/2014/main" id="{72C6E6F5-CDF2-2C71-7DD2-3A53BB06A9F0}"/>
+              </a:ext>
+            </a:extLst>
+          </p:cNvPr>
+          <p:cNvPicPr>
+            <a:picLocks noChangeAspect="1"/>
+          </p:cNvPicPr>
+          <p:nvPr/>
+        </p:nvPicPr>
+        <p:blipFill>
+          <a:blip r:embed="rId5">
+            <a:extLst>
+              <a:ext uri="{28A0092B-C50C-407E-A947-70E740481C1C}">
+                <a14:useLocalDpi xmlns:a14="http://schemas.microsoft.com/office/drawing/2010/main" val="0"/>
+              </a:ext>
+            </a:extLst>
+          </a:blip>
+          <a:stretch>
+            <a:fillRect/>
+          </a:stretch>
+        </p:blipFill>
+        <p:spPr>
+          <a:xfrm>
+            <a:off x="36388809" y="25378988"/>
+            <a:ext cx="3133834" cy="4184590"/>
+          </a:xfrm>
+          <a:prstGeom prst="rect">
+            <a:avLst/>
+          </a:prstGeom>
+        </p:spPr>
+      </p:pic>
     </p:spTree>
   </p:cSld>
   <p:clrMapOvr>
@@ -9221,6 +10048,15 @@
 </file>
 
 <file path=customXml/item1.xml><?xml version="1.0" encoding="utf-8"?>
+<?mso-contentType ?>
+<FormTemplates xmlns="http://schemas.microsoft.com/sharepoint/v3/contenttype/forms">
+  <Display>DocumentLibraryForm</Display>
+  <Edit>DocumentLibraryForm</Edit>
+  <New>DocumentLibraryForm</New>
+</FormTemplates>
+</file>
+
+<file path=customXml/item2.xml><?xml version="1.0" encoding="utf-8"?>
 <ct:contentTypeSchema xmlns:ct="http://schemas.microsoft.com/office/2006/metadata/contentType" xmlns:ma="http://schemas.microsoft.com/office/2006/metadata/properties/metaAttributes" ct:_="" ma:_="" ma:contentTypeName="Document" ma:contentTypeID="0x010100417EE05FAEEAC1409A37E08D62A167CC" ma:contentTypeVersion="16" ma:contentTypeDescription="Create a new document." ma:contentTypeScope="" ma:versionID="d38f75698845d0233a434ea18f84529f">
   <xsd:schema xmlns:xsd="http://www.w3.org/2001/XMLSchema" xmlns:xs="http://www.w3.org/2001/XMLSchema" xmlns:p="http://schemas.microsoft.com/office/2006/metadata/properties" xmlns:ns2="1b973d31-3774-4da0-b147-c5c4bcddf3f1" xmlns:ns3="70993a03-c97d-4535-9029-6811f6dade7d" targetNamespace="http://schemas.microsoft.com/office/2006/metadata/properties" ma:root="true" ma:fieldsID="a74dd64343ab600dab1d05f807349ef8" ns2:_="" ns3:_="">
     <xsd:import namespace="1b973d31-3774-4da0-b147-c5c4bcddf3f1"/>
@@ -9464,7 +10300,7 @@
 </ct:contentTypeSchema>
 </file>
 
-<file path=customXml/item2.xml><?xml version="1.0" encoding="utf-8"?>
+<file path=customXml/item3.xml><?xml version="1.0" encoding="utf-8"?>
 <p:properties xmlns:p="http://schemas.microsoft.com/office/2006/metadata/properties" xmlns:xsi="http://www.w3.org/2001/XMLSchema-instance" xmlns:pc="http://schemas.microsoft.com/office/infopath/2007/PartnerControls">
   <documentManagement>
     <Tointerview xmlns="1b973d31-3774-4da0-b147-c5c4bcddf3f1" xsi:nil="true"/>
@@ -9476,16 +10312,15 @@
 </p:properties>
 </file>
 
-<file path=customXml/item3.xml><?xml version="1.0" encoding="utf-8"?>
-<?mso-contentType ?>
-<FormTemplates xmlns="http://schemas.microsoft.com/sharepoint/v3/contenttype/forms">
-  <Display>DocumentLibraryForm</Display>
-  <Edit>DocumentLibraryForm</Edit>
-  <New>DocumentLibraryForm</New>
-</FormTemplates>
+<file path=customXml/itemProps1.xml><?xml version="1.0" encoding="utf-8"?>
+<ds:datastoreItem xmlns:ds="http://schemas.openxmlformats.org/officeDocument/2006/customXml" ds:itemID="{C5752171-D2AC-449D-BF8B-BB587F6BC2E2}">
+  <ds:schemaRefs>
+    <ds:schemaRef ds:uri="http://schemas.microsoft.com/sharepoint/v3/contenttype/forms"/>
+  </ds:schemaRefs>
+</ds:datastoreItem>
 </file>
 
-<file path=customXml/itemProps1.xml><?xml version="1.0" encoding="utf-8"?>
+<file path=customXml/itemProps2.xml><?xml version="1.0" encoding="utf-8"?>
 <ds:datastoreItem xmlns:ds="http://schemas.openxmlformats.org/officeDocument/2006/customXml" ds:itemID="{59D0C72A-7B1C-49EC-9E13-51450835DFE9}">
   <ds:schemaRefs>
     <ds:schemaRef ds:uri="http://schemas.microsoft.com/office/2006/metadata/contentType"/>
@@ -9504,7 +10339,7 @@
 </ds:datastoreItem>
 </file>
 
-<file path=customXml/itemProps2.xml><?xml version="1.0" encoding="utf-8"?>
+<file path=customXml/itemProps3.xml><?xml version="1.0" encoding="utf-8"?>
 <ds:datastoreItem xmlns:ds="http://schemas.openxmlformats.org/officeDocument/2006/customXml" ds:itemID="{41BEBB12-6065-46A7-A2D8-A1BACDD0BE00}">
   <ds:schemaRefs>
     <ds:schemaRef ds:uri="http://schemas.microsoft.com/office/2006/metadata/properties"/>
@@ -9521,12 +10356,4 @@
     <ds:schemaRef ds:uri="70993a03-c97d-4535-9029-6811f6dade7d"/>
   </ds:schemaRefs>
 </ds:datastoreItem>
-</file>
-
-<file path=customXml/itemProps3.xml><?xml version="1.0" encoding="utf-8"?>
-<ds:datastoreItem xmlns:ds="http://schemas.openxmlformats.org/officeDocument/2006/customXml" ds:itemID="{C5752171-D2AC-449D-BF8B-BB587F6BC2E2}">
-  <ds:schemaRefs>
-    <ds:schemaRef ds:uri="http://schemas.microsoft.com/sharepoint/v3/contenttype/forms"/>
-  </ds:schemaRefs>
-</ds:datastoreItem>
 </file>
</xml_diff>